<commit_message>
updates on clothing class count
</commit_message>
<xml_diff>
--- a/kaggle data  exploration/Women's Clothing Review Presentation - Obed & Anita.pptx
+++ b/kaggle data  exploration/Women's Clothing Review Presentation - Obed & Anita.pptx
@@ -118,6 +118,11 @@
       </a:defRPr>
     </a:lvl9pPr>
   </p:defaultTextStyle>
+  <p:extLst>
+    <p:ext uri="{EFAFB233-063F-42B5-8137-9DF3F51BA10A}">
+      <p15:sldGuideLst xmlns:p15="http://schemas.microsoft.com/office/powerpoint/2012/main"/>
+    </p:ext>
+  </p:extLst>
 </p:presentation>
 </file>
 
@@ -14921,7 +14926,7 @@
                 <a:latin typeface="Times New Roman" panose="02020603050405020304" pitchFamily="18" charset="0"/>
                 <a:cs typeface="Times New Roman" panose="02020603050405020304" pitchFamily="18" charset="0"/>
               </a:rPr>
-              <a:t>Fig 9 :    A graph showing the top 50 most popular items and their respective Clothing ID</a:t>
+              <a:t>Fig 9 :    A graph showing the Most popular Clothing Classes</a:t>
             </a:r>
             <a:br>
               <a:rPr lang="en-US" sz="2400" dirty="0">
@@ -14938,10 +14943,10 @@
       </p:sp>
       <p:pic>
         <p:nvPicPr>
-          <p:cNvPr id="4" name="Content Placeholder 3">
+          <p:cNvPr id="12" name="Content Placeholder 11" descr="A close up of a logo&#10;&#10;Description automatically generated">
             <a:extLst>
               <a:ext uri="{FF2B5EF4-FFF2-40B4-BE49-F238E27FC236}">
-                <a16:creationId xmlns:a16="http://schemas.microsoft.com/office/drawing/2014/main" id="{AD8B642D-5A06-469D-8FA1-F501B7E66181}"/>
+                <a16:creationId xmlns:a16="http://schemas.microsoft.com/office/drawing/2014/main" id="{BC235421-0F25-426D-A32A-B688B3662D0C}"/>
               </a:ext>
             </a:extLst>
           </p:cNvPr>
@@ -14960,12 +14965,9 @@
         </p:blipFill>
         <p:spPr>
           <a:xfrm>
-            <a:off x="1311518" y="403079"/>
-            <a:ext cx="10651882" cy="5518442"/>
+            <a:off x="1636295" y="336884"/>
+            <a:ext cx="10206181" cy="5584635"/>
           </a:xfrm>
-          <a:prstGeom prst="rect">
-            <a:avLst/>
-          </a:prstGeom>
         </p:spPr>
       </p:pic>
     </p:spTree>

</xml_diff>